<commit_message>
RCS.pptx moved from session4 to session5, and complete
</commit_message>
<xml_diff>
--- a/doc/slides/day2/session5/RCS.pptx
+++ b/doc/slides/day2/session5/RCS.pptx
@@ -3639,12 +3639,33 @@
         </p:nvSpPr>
         <p:spPr/>
         <p:txBody>
-          <a:bodyPr/>
-          <a:lstStyle/>
-          <a:p>
-            <a:r>
-              <a:rPr lang="en-US" dirty="0" smtClean="0"/>
-              <a:t>Version control systems</a:t>
+          <a:bodyPr>
+            <a:normAutofit fontScale="90000"/>
+          </a:bodyPr>
+          <a:lstStyle/>
+          <a:p>
+            <a:r>
+              <a:rPr lang="en-US" dirty="0" smtClean="0"/>
+              <a:t>Version control </a:t>
+            </a:r>
+            <a:r>
+              <a:rPr lang="en-US" dirty="0" smtClean="0"/>
+              <a:t>systems</a:t>
+            </a:r>
+            <a:br>
+              <a:rPr lang="en-US" dirty="0" smtClean="0"/>
+            </a:br>
+            <a:r>
+              <a:rPr lang="en-US" dirty="0" smtClean="0"/>
+              <a:t>(Revision control, Source </a:t>
+            </a:r>
+            <a:r>
+              <a:rPr lang="en-US" dirty="0" smtClean="0"/>
+              <a:t>c</a:t>
+            </a:r>
+            <a:r>
+              <a:rPr lang="en-US" dirty="0" smtClean="0"/>
+              <a:t>ontrol management)</a:t>
             </a:r>
             <a:endParaRPr lang="en-US" dirty="0"/>
           </a:p>
@@ -3827,11 +3848,7 @@
             </a:r>
             <a:r>
               <a:rPr lang="en-US" sz="2400" i="1" dirty="0" smtClean="0"/>
-              <a:t> path, or http</a:t>
-            </a:r>
-            <a:r>
-              <a:rPr lang="en-US" sz="2400" i="1" dirty="0" smtClean="0"/>
-              <a:t>)</a:t>
+              <a:t> path, or http)</a:t>
             </a:r>
           </a:p>
           <a:p>
@@ -4521,7 +4538,6 @@
               <a:rPr lang="en-US" dirty="0" smtClean="0"/>
               <a:t>discard the changes, and revert the file to the previous version</a:t>
             </a:r>
-            <a:endParaRPr lang="en-US" dirty="0" smtClean="0"/>
           </a:p>
           <a:p>
             <a:r>
@@ -4551,13 +4567,7 @@
               <a:rPr lang="en-US" dirty="0" smtClean="0">
                 <a:hlinkClick r:id="rId2"/>
               </a:rPr>
-              <a:t>https://github.com/rvosa/ngs-</a:t>
-            </a:r>
-            <a:r>
-              <a:rPr lang="en-US" dirty="0" smtClean="0">
-                <a:hlinkClick r:id="rId2"/>
-              </a:rPr>
-              <a:t>workflows</a:t>
+              <a:t>https://github.com/rvosa/ngs-workflows</a:t>
             </a:r>
             <a:endParaRPr lang="en-US" dirty="0" smtClean="0"/>
           </a:p>

</xml_diff>